<commit_message>
Added updated registration screenshot
</commit_message>
<xml_diff>
--- a/Deliverable4/Rock_Stars_Final_Presentation.pptx
+++ b/Deliverable4/Rock_Stars_Final_Presentation.pptx
@@ -32,22 +32,6 @@
   </p:sldIdLst>
   <p:sldSz cx="9144000" cy="6858000" type="screen4x3"/>
   <p:notesSz cx="6858000" cy="9144000"/>
-  <p:embeddedFontLst>
-    <p:embeddedFont>
-      <p:font typeface="Roboto" panose="020B0604020202020204" charset="0"/>
-      <p:regular r:id="rId24"/>
-      <p:bold r:id="rId25"/>
-      <p:italic r:id="rId26"/>
-      <p:boldItalic r:id="rId27"/>
-    </p:embeddedFont>
-    <p:embeddedFont>
-      <p:font typeface="Calibri" panose="020F0502020204030204" pitchFamily="34" charset="0"/>
-      <p:regular r:id="rId28"/>
-      <p:bold r:id="rId29"/>
-      <p:italic r:id="rId30"/>
-      <p:boldItalic r:id="rId31"/>
-    </p:embeddedFont>
-  </p:embeddedFontLst>
   <p:defaultTextStyle>
     <a:defPPr marR="0" lvl="0" algn="l" rtl="0">
       <a:lnSpc>
@@ -252,7 +236,7 @@
   </p:defaultTextStyle>
   <p:extLst>
     <p:ext uri="{EFAFB233-063F-42B5-8137-9DF3F51BA10A}">
-      <p15:sldGuideLst xmlns:p15="http://schemas.microsoft.com/office/powerpoint/2012/main"/>
+      <p15:sldGuideLst xmlns:p15="http://schemas.microsoft.com/office/powerpoint/2012/main" xmlns=""/>
     </p:ext>
   </p:extLst>
 </p:presentation>
@@ -18825,13 +18809,13 @@
   <p:clrMapOvr>
     <a:masterClrMapping/>
   </p:clrMapOvr>
-  <p:transition spd="slow">
+  <p:transition xmlns:p14="http://schemas.microsoft.com/office/powerpoint/2010/main" spd="slow">
     <p:cut/>
   </p:transition>
   <p:timing>
     <p:tnLst>
       <p:par>
-        <p:cTn id="1" dur="indefinite" restart="never" nodeType="tmRoot"/>
+        <p:cTn xmlns:p14="http://schemas.microsoft.com/office/powerpoint/2010/main" id="1" dur="indefinite" restart="never" nodeType="tmRoot"/>
       </p:par>
     </p:tnLst>
   </p:timing>
@@ -18944,13 +18928,13 @@
   <p:clrMapOvr>
     <a:masterClrMapping/>
   </p:clrMapOvr>
-  <p:transition spd="slow">
+  <p:transition xmlns:p14="http://schemas.microsoft.com/office/powerpoint/2010/main" spd="slow">
     <p:cut/>
   </p:transition>
   <p:timing>
     <p:tnLst>
       <p:par>
-        <p:cTn id="1" dur="indefinite" restart="never" nodeType="tmRoot"/>
+        <p:cTn xmlns:p14="http://schemas.microsoft.com/office/powerpoint/2010/main" id="1" dur="indefinite" restart="never" nodeType="tmRoot"/>
       </p:par>
     </p:tnLst>
   </p:timing>
@@ -19302,13 +19286,13 @@
   <p:clrMapOvr>
     <a:masterClrMapping/>
   </p:clrMapOvr>
-  <p:transition spd="slow">
+  <p:transition xmlns:p14="http://schemas.microsoft.com/office/powerpoint/2010/main" spd="slow">
     <p:cut/>
   </p:transition>
   <p:timing>
     <p:tnLst>
       <p:par>
-        <p:cTn id="1" dur="indefinite" restart="never" nodeType="tmRoot"/>
+        <p:cTn xmlns:p14="http://schemas.microsoft.com/office/powerpoint/2010/main" id="1" dur="indefinite" restart="never" nodeType="tmRoot"/>
       </p:par>
     </p:tnLst>
   </p:timing>
@@ -19884,13 +19868,13 @@
   <p:clrMapOvr>
     <a:masterClrMapping/>
   </p:clrMapOvr>
-  <p:transition spd="slow">
+  <p:transition xmlns:p14="http://schemas.microsoft.com/office/powerpoint/2010/main" spd="slow">
     <p:cut/>
   </p:transition>
   <p:timing>
     <p:tnLst>
       <p:par>
-        <p:cTn id="1" dur="indefinite" restart="never" nodeType="tmRoot"/>
+        <p:cTn xmlns:p14="http://schemas.microsoft.com/office/powerpoint/2010/main" id="1" dur="indefinite" restart="never" nodeType="tmRoot"/>
       </p:par>
     </p:tnLst>
   </p:timing>
@@ -20705,13 +20689,13 @@
   <p:clrMapOvr>
     <a:masterClrMapping/>
   </p:clrMapOvr>
-  <p:transition spd="slow">
+  <p:transition xmlns:p14="http://schemas.microsoft.com/office/powerpoint/2010/main" spd="slow">
     <p:cut/>
   </p:transition>
   <p:timing>
     <p:tnLst>
       <p:par>
-        <p:cTn id="1" dur="indefinite" restart="never" nodeType="tmRoot"/>
+        <p:cTn xmlns:p14="http://schemas.microsoft.com/office/powerpoint/2010/main" id="1" dur="indefinite" restart="never" nodeType="tmRoot"/>
       </p:par>
     </p:tnLst>
   </p:timing>
@@ -21184,13 +21168,13 @@
   <p:clrMapOvr>
     <a:masterClrMapping/>
   </p:clrMapOvr>
-  <p:transition spd="slow">
+  <p:transition xmlns:p14="http://schemas.microsoft.com/office/powerpoint/2010/main" spd="slow">
     <p:cut/>
   </p:transition>
   <p:timing>
     <p:tnLst>
       <p:par>
-        <p:cTn id="1" dur="indefinite" restart="never" nodeType="tmRoot"/>
+        <p:cTn xmlns:p14="http://schemas.microsoft.com/office/powerpoint/2010/main" id="1" dur="indefinite" restart="never" nodeType="tmRoot"/>
       </p:par>
     </p:tnLst>
   </p:timing>
@@ -21822,13 +21806,13 @@
   <p:clrMapOvr>
     <a:masterClrMapping/>
   </p:clrMapOvr>
-  <p:transition spd="slow">
+  <p:transition xmlns:p14="http://schemas.microsoft.com/office/powerpoint/2010/main" spd="slow">
     <p:cut/>
   </p:transition>
   <p:timing>
     <p:tnLst>
       <p:par>
-        <p:cTn id="1" dur="indefinite" restart="never" nodeType="tmRoot"/>
+        <p:cTn xmlns:p14="http://schemas.microsoft.com/office/powerpoint/2010/main" id="1" dur="indefinite" restart="never" nodeType="tmRoot"/>
       </p:par>
     </p:tnLst>
   </p:timing>
@@ -22001,13 +21985,13 @@
   <p:clrMapOvr>
     <a:masterClrMapping/>
   </p:clrMapOvr>
-  <p:transition spd="slow">
+  <p:transition xmlns:p14="http://schemas.microsoft.com/office/powerpoint/2010/main" spd="slow">
     <p:cut/>
   </p:transition>
   <p:timing>
     <p:tnLst>
       <p:par>
-        <p:cTn id="1" dur="indefinite" restart="never" nodeType="tmRoot"/>
+        <p:cTn xmlns:p14="http://schemas.microsoft.com/office/powerpoint/2010/main" id="1" dur="indefinite" restart="never" nodeType="tmRoot"/>
       </p:par>
     </p:tnLst>
   </p:timing>
@@ -22189,13 +22173,13 @@
   <p:clrMapOvr>
     <a:masterClrMapping/>
   </p:clrMapOvr>
-  <p:transition spd="slow">
+  <p:transition xmlns:p14="http://schemas.microsoft.com/office/powerpoint/2010/main" spd="slow">
     <p:cut/>
   </p:transition>
   <p:timing>
     <p:tnLst>
       <p:par>
-        <p:cTn id="1" dur="indefinite" restart="never" nodeType="tmRoot"/>
+        <p:cTn xmlns:p14="http://schemas.microsoft.com/office/powerpoint/2010/main" id="1" dur="indefinite" restart="never" nodeType="tmRoot"/>
       </p:par>
     </p:tnLst>
   </p:timing>
@@ -22301,13 +22285,13 @@
   <p:clrMapOvr>
     <a:masterClrMapping/>
   </p:clrMapOvr>
-  <p:transition spd="slow" advTm="34069">
+  <p:transition xmlns:p14="http://schemas.microsoft.com/office/powerpoint/2010/main" spd="slow" advTm="34069">
     <p:cut/>
   </p:transition>
   <p:timing>
     <p:tnLst>
       <p:par>
-        <p:cTn id="1" dur="indefinite" restart="never" nodeType="tmRoot"/>
+        <p:cTn xmlns:p14="http://schemas.microsoft.com/office/powerpoint/2010/main" id="1" dur="indefinite" restart="never" nodeType="tmRoot"/>
       </p:par>
     </p:tnLst>
   </p:timing>
@@ -22756,13 +22740,13 @@
   <p:clrMapOvr>
     <a:masterClrMapping/>
   </p:clrMapOvr>
-  <p:transition spd="slow">
+  <p:transition xmlns:p14="http://schemas.microsoft.com/office/powerpoint/2010/main" spd="slow">
     <p:cut/>
   </p:transition>
   <p:timing>
     <p:tnLst>
       <p:par>
-        <p:cTn id="1" dur="indefinite" restart="never" nodeType="tmRoot"/>
+        <p:cTn xmlns:p14="http://schemas.microsoft.com/office/powerpoint/2010/main" id="1" dur="indefinite" restart="never" nodeType="tmRoot"/>
       </p:par>
     </p:tnLst>
   </p:timing>
@@ -23174,13 +23158,13 @@
   <p:clrMapOvr>
     <a:masterClrMapping/>
   </p:clrMapOvr>
-  <p:transition spd="slow">
+  <p:transition xmlns:p14="http://schemas.microsoft.com/office/powerpoint/2010/main" spd="slow">
     <p:cut/>
   </p:transition>
   <p:timing>
     <p:tnLst>
       <p:par>
-        <p:cTn id="1" dur="indefinite" restart="never" nodeType="tmRoot"/>
+        <p:cTn xmlns:p14="http://schemas.microsoft.com/office/powerpoint/2010/main" id="1" dur="indefinite" restart="never" nodeType="tmRoot"/>
       </p:par>
     </p:tnLst>
   </p:timing>
@@ -23652,13 +23636,13 @@
   <p:clrMapOvr>
     <a:masterClrMapping/>
   </p:clrMapOvr>
-  <p:transition spd="slow">
+  <p:transition xmlns:p14="http://schemas.microsoft.com/office/powerpoint/2010/main" spd="slow">
     <p:cut/>
   </p:transition>
   <p:timing>
     <p:tnLst>
       <p:par>
-        <p:cTn id="1" dur="indefinite" restart="never" nodeType="tmRoot"/>
+        <p:cTn xmlns:p14="http://schemas.microsoft.com/office/powerpoint/2010/main" id="1" dur="indefinite" restart="never" nodeType="tmRoot"/>
       </p:par>
     </p:tnLst>
   </p:timing>
@@ -24052,6 +24036,36 @@
           </a:prstGeom>
         </p:spPr>
       </p:pic>
+      <p:pic>
+        <p:nvPicPr>
+          <p:cNvPr id="3" name="Picture 2" descr="00000745.png"/>
+          <p:cNvPicPr>
+            <a:picLocks noChangeAspect="1"/>
+          </p:cNvPicPr>
+          <p:nvPr/>
+        </p:nvPicPr>
+        <p:blipFill>
+          <a:blip r:embed="rId5">
+            <a:extLst>
+              <a:ext uri="{28A0092B-C50C-407E-A947-70E740481C1C}">
+                <a14:useLocalDpi xmlns:a14="http://schemas.microsoft.com/office/drawing/2010/main" val="0"/>
+              </a:ext>
+            </a:extLst>
+          </a:blip>
+          <a:stretch>
+            <a:fillRect/>
+          </a:stretch>
+        </p:blipFill>
+        <p:spPr>
+          <a:xfrm>
+            <a:off x="989654" y="759892"/>
+            <a:ext cx="6457500" cy="4169053"/>
+          </a:xfrm>
+          <a:prstGeom prst="rect">
+            <a:avLst/>
+          </a:prstGeom>
+        </p:spPr>
+      </p:pic>
     </p:spTree>
     <p:extLst>
       <p:ext uri="{BB962C8B-B14F-4D97-AF65-F5344CB8AC3E}">
@@ -24062,13 +24076,13 @@
   <p:clrMapOvr>
     <a:masterClrMapping/>
   </p:clrMapOvr>
-  <p:transition spd="slow">
+  <p:transition xmlns:p14="http://schemas.microsoft.com/office/powerpoint/2010/main" spd="slow">
     <p:cut/>
   </p:transition>
   <p:timing>
     <p:tnLst>
       <p:par>
-        <p:cTn id="1" dur="indefinite" restart="never" nodeType="tmRoot"/>
+        <p:cTn xmlns:p14="http://schemas.microsoft.com/office/powerpoint/2010/main" id="1" dur="indefinite" restart="never" nodeType="tmRoot"/>
       </p:par>
     </p:tnLst>
   </p:timing>

</xml_diff>

<commit_message>
added narration to presentation
</commit_message>
<xml_diff>
--- a/Deliverable4/Rock_Stars_Final_Presentation.pptx
+++ b/Deliverable4/Rock_Stars_Final_Presentation.pptx
@@ -236,7 +236,7 @@
   </p:defaultTextStyle>
   <p:extLst>
     <p:ext uri="{EFAFB233-063F-42B5-8137-9DF3F51BA10A}">
-      <p15:sldGuideLst xmlns:p15="http://schemas.microsoft.com/office/powerpoint/2012/main" xmlns=""/>
+      <p15:sldGuideLst xmlns="" xmlns:p15="http://schemas.microsoft.com/office/powerpoint/2012/main"/>
     </p:ext>
   </p:extLst>
 </p:presentation>
@@ -18914,7 +18914,34 @@
           <a:bodyPr/>
           <a:lstStyle/>
           <a:p>
+            <a:r>
+              <a:rPr lang="en-US" dirty="0" smtClean="0"/>
+              <a:t>Please enjoy our demo video of Safe Travels at the following link:</a:t>
+            </a:r>
+          </a:p>
+          <a:p>
+            <a:endParaRPr lang="en-US" dirty="0"/>
+          </a:p>
+          <a:p>
+            <a:r>
+              <a:rPr lang="en-US" dirty="0">
+                <a:hlinkClick r:id="rId3"/>
+              </a:rPr>
+              <a:t>https://www.youtube.com/watch?v=</a:t>
+            </a:r>
+            <a:r>
+              <a:rPr lang="en-US" dirty="0" smtClean="0">
+                <a:hlinkClick r:id="rId3"/>
+              </a:rPr>
+              <a:t>SINLe0TnUMc</a:t>
+            </a:r>
+            <a:endParaRPr lang="en-US" dirty="0" smtClean="0"/>
+          </a:p>
+          <a:p>
             <a:endParaRPr lang="en-US"/>
+          </a:p>
+          <a:p>
+            <a:endParaRPr lang="en-US" dirty="0"/>
           </a:p>
         </p:txBody>
       </p:sp>
@@ -22070,16 +22097,6 @@
           </a:p>
           <a:p>
             <a:endParaRPr lang="en-US" dirty="0"/>
-          </a:p>
-          <a:p>
-            <a:r>
-              <a:rPr lang="en-US" dirty="0" smtClean="0"/>
-              <a:t>Did </a:t>
-            </a:r>
-            <a:r>
-              <a:rPr lang="en-US" dirty="0"/>
-              <a:t>we succeed? We will let you be the judge of that.</a:t>
-            </a:r>
           </a:p>
         </p:txBody>
       </p:sp>
@@ -23246,7 +23263,15 @@
             </a:r>
             <a:r>
               <a:rPr lang="en-US" dirty="0"/>
-              <a:t> FHIR server, we were not able to save our Patient and Immunization resources there. </a:t>
+              <a:t> FHIR server, we were not able to </a:t>
+            </a:r>
+            <a:r>
+              <a:rPr lang="en-US" dirty="0" smtClean="0"/>
+              <a:t>persist </a:t>
+            </a:r>
+            <a:r>
+              <a:rPr lang="en-US" dirty="0"/>
+              <a:t>our Patient and Immunization resources there. </a:t>
             </a:r>
           </a:p>
           <a:p>
@@ -23293,62 +23318,9 @@
             <a:endParaRPr lang="en-US" dirty="0"/>
           </a:p>
           <a:p>
-            <a:pPr marL="342900" indent="-342900">
-              <a:buFont typeface="Arial" panose="020B0604020202020204" pitchFamily="34" charset="0"/>
-              <a:buChar char="•"/>
+            <a:pPr marL="311150" lvl="1" indent="0">
+              <a:buNone/>
             </a:pPr>
-            <a:r>
-              <a:rPr lang="en-US" dirty="0" smtClean="0"/>
-              <a:t>Due </a:t>
-            </a:r>
-            <a:r>
-              <a:rPr lang="en-US" dirty="0"/>
-              <a:t>to the limitations of our free </a:t>
-            </a:r>
-            <a:r>
-              <a:rPr lang="en-US" dirty="0" err="1"/>
-              <a:t>Heroku</a:t>
-            </a:r>
-            <a:r>
-              <a:rPr lang="en-US" dirty="0"/>
-              <a:t> account, we did not have enough worker threads to run our scheduler jobs automatically. </a:t>
-            </a:r>
-          </a:p>
-          <a:p>
-            <a:pPr marL="809244" lvl="1" indent="-342900">
-              <a:buFont typeface="Arial" panose="020B0604020202020204" pitchFamily="34" charset="0"/>
-              <a:buChar char="•"/>
-            </a:pPr>
-            <a:r>
-              <a:rPr lang="en-US" dirty="0"/>
-              <a:t>  </a:t>
-            </a:r>
-            <a:r>
-              <a:rPr lang="en-US" dirty="0">
-                <a:solidFill>
-                  <a:schemeClr val="bg2">
-                    <a:lumMod val="60000"/>
-                    <a:lumOff val="40000"/>
-                  </a:schemeClr>
-                </a:solidFill>
-              </a:rPr>
-              <a:t>Workaround: </a:t>
-            </a:r>
-            <a:r>
-              <a:rPr lang="en-US" dirty="0"/>
-              <a:t>we demonstrated a proof of concept by manually allocating threads within the </a:t>
-            </a:r>
-            <a:r>
-              <a:rPr lang="en-US" dirty="0" err="1"/>
-              <a:t>Heroku</a:t>
-            </a:r>
-            <a:r>
-              <a:rPr lang="en-US" dirty="0"/>
-              <a:t> application to run our alerting and notification processes.</a:t>
-            </a:r>
-          </a:p>
-          <a:p>
-            <a:pPr lvl="1"/>
             <a:endParaRPr lang="en-US" dirty="0"/>
           </a:p>
           <a:p>
@@ -23895,8 +23867,24 @@
               <a:t>Go </a:t>
             </a:r>
             <a:r>
+              <a:rPr lang="en-US" sz="1800" b="0" i="0" u="none" strike="noStrike" cap="none" dirty="0" smtClean="0">
+                <a:solidFill>
+                  <a:schemeClr val="lt1"/>
+                </a:solidFill>
+                <a:latin typeface="Calibri"/>
+                <a:ea typeface="Calibri"/>
+                <a:cs typeface="Calibri"/>
+                <a:sym typeface="Calibri"/>
+              </a:rPr>
+              <a:t>to </a:t>
+            </a:r>
+            <a:r>
+              <a:rPr lang="en-US" sz="1800" dirty="0" smtClean="0"/>
+              <a:t>the </a:t>
+            </a:r>
+            <a:r>
               <a:rPr lang="en-US" sz="1800" dirty="0"/>
-              <a:t>the website: </a:t>
+              <a:t>website: </a:t>
             </a:r>
             <a:r>
               <a:rPr lang="en-US" sz="1800" dirty="0">

</xml_diff>